<commit_message>
git reflog and git checkout hash
</commit_message>
<xml_diff>
--- a/Git入門.pptx
+++ b/Git入門.pptx
@@ -4851,12 +4851,12 @@
       </p:par>
     </p:tnLst>
     <p:bldLst>
+      <p:bldP build="whole" bldLvl="1" animBg="1" rev="0" advAuto="0" spid="388" grpId="3"/>
+      <p:bldP build="whole" bldLvl="1" animBg="1" rev="0" advAuto="0" spid="385" grpId="2"/>
+      <p:bldP build="whole" bldLvl="1" animBg="1" rev="0" advAuto="0" spid="386" grpId="4"/>
+      <p:bldP build="whole" bldLvl="1" animBg="1" rev="0" advAuto="0" spid="379" grpId="1"/>
+      <p:bldP build="whole" bldLvl="1" animBg="1" rev="0" advAuto="0" spid="362" grpId="6"/>
       <p:bldP build="whole" bldLvl="1" animBg="1" rev="0" advAuto="0" spid="384" grpId="5"/>
-      <p:bldP build="whole" bldLvl="1" animBg="1" rev="0" advAuto="0" spid="362" grpId="6"/>
-      <p:bldP build="whole" bldLvl="1" animBg="1" rev="0" advAuto="0" spid="385" grpId="2"/>
-      <p:bldP build="whole" bldLvl="1" animBg="1" rev="0" advAuto="0" spid="379" grpId="1"/>
-      <p:bldP build="whole" bldLvl="1" animBg="1" rev="0" advAuto="0" spid="388" grpId="3"/>
-      <p:bldP build="whole" bldLvl="1" animBg="1" rev="0" advAuto="0" spid="386" grpId="4"/>
     </p:bldLst>
   </p:timing>
 </p:sld>
@@ -6411,12 +6411,12 @@
       </p:par>
     </p:tnLst>
     <p:bldLst>
+      <p:bldP build="whole" bldLvl="1" animBg="1" rev="0" advAuto="0" spid="392" grpId="2"/>
+      <p:bldP build="whole" bldLvl="1" animBg="1" rev="0" advAuto="0" spid="414" grpId="5"/>
       <p:bldP build="whole" bldLvl="1" animBg="1" rev="0" advAuto="0" spid="418" grpId="6"/>
+      <p:bldP build="whole" bldLvl="1" animBg="1" rev="0" advAuto="0" spid="415" grpId="4"/>
+      <p:bldP build="whole" bldLvl="1" animBg="1" rev="0" advAuto="0" spid="409" grpId="1"/>
       <p:bldP build="whole" bldLvl="1" animBg="1" rev="0" advAuto="0" spid="417" grpId="3"/>
-      <p:bldP build="whole" bldLvl="1" animBg="1" rev="0" advAuto="0" spid="414" grpId="5"/>
-      <p:bldP build="whole" bldLvl="1" animBg="1" rev="0" advAuto="0" spid="409" grpId="1"/>
-      <p:bldP build="whole" bldLvl="1" animBg="1" rev="0" advAuto="0" spid="392" grpId="2"/>
-      <p:bldP build="whole" bldLvl="1" animBg="1" rev="0" advAuto="0" spid="415" grpId="4"/>
     </p:bldLst>
   </p:timing>
 </p:sld>
@@ -6532,7 +6532,7 @@
         <p:spPr>
           <a:xfrm>
             <a:off x="1675221" y="3364943"/>
-            <a:ext cx="4968241" cy="4064001"/>
+            <a:ext cx="4740555" cy="4064001"/>
           </a:xfrm>
           <a:prstGeom prst="rect">
             <a:avLst/>
@@ -6632,7 +6632,7 @@
               </a:defRPr>
             </a:pPr>
             <a:r>
-              <a:t>#git log</a:t>
+              <a:t>#git reflog</a:t>
             </a:r>
           </a:p>
           <a:p>
@@ -6644,7 +6644,7 @@
               </a:defRPr>
             </a:pPr>
             <a:r>
-              <a:t>#git reset HEAD e3dcf77bea</a:t>
+              <a:t>#git checkout e3dcf77bea</a:t>
             </a:r>
           </a:p>
         </p:txBody>
@@ -6839,7 +6839,7 @@
               <a:buAutoNum type="arabicPeriod" startAt="1"/>
             </a:pPr>
             <a:r>
-              <a:t>git log       過去コミットしたリポジトリの履歴を確認する</a:t>
+              <a:t>git reflog       過去コミットしたリポジトリの履歴を確認する</a:t>
             </a:r>
           </a:p>
           <a:p>
@@ -6848,7 +6848,7 @@
               <a:buAutoNum type="arabicPeriod" startAt="1"/>
             </a:pPr>
             <a:r>
-              <a:t>git reset HEAD  e3dcf77bea   リポジトリをe3dcf77beaに戻る</a:t>
+              <a:t>git checkout e3dcf77bea   リポジトリをe3dcf77beaに戻る</a:t>
             </a:r>
           </a:p>
         </p:txBody>
@@ -8742,18 +8742,18 @@
       </p:par>
     </p:tnLst>
     <p:bldLst>
-      <p:bldP build="whole" bldLvl="1" animBg="1" rev="0" advAuto="0" spid="470" grpId="11"/>
-      <p:bldP build="whole" bldLvl="1" animBg="1" rev="0" advAuto="0" spid="461" grpId="9"/>
+      <p:bldP build="whole" bldLvl="1" animBg="1" rev="0" advAuto="0" spid="468" grpId="7"/>
       <p:bldP build="whole" bldLvl="1" animBg="1" rev="0" advAuto="0" spid="456" grpId="3"/>
       <p:bldP build="whole" bldLvl="1" animBg="1" rev="0" advAuto="0" spid="439" grpId="4"/>
-      <p:bldP build="whole" bldLvl="1" animBg="1" rev="0" advAuto="0" spid="468" grpId="7"/>
+      <p:bldP build="whole" bldLvl="1" animBg="1" rev="0" advAuto="0" spid="465" grpId="5"/>
       <p:bldP build="whole" bldLvl="1" animBg="1" rev="0" advAuto="0" spid="460" grpId="8"/>
+      <p:bldP build="whole" bldLvl="1" animBg="1" rev="0" advAuto="0" spid="462" grpId="10"/>
+      <p:bldP build="whole" bldLvl="1" animBg="1" rev="0" advAuto="0" spid="461" grpId="9"/>
       <p:bldP build="whole" bldLvl="1" animBg="1" rev="0" advAuto="0" spid="436" grpId="1"/>
+      <p:bldP build="whole" bldLvl="1" animBg="1" rev="0" advAuto="0" spid="459" grpId="6"/>
       <p:bldP build="whole" bldLvl="1" animBg="1" rev="0" advAuto="0" spid="436" grpId="2"/>
-      <p:bldP build="whole" bldLvl="1" animBg="1" rev="0" advAuto="0" spid="462" grpId="10"/>
       <p:bldP build="whole" bldLvl="1" animBg="1" rev="0" advAuto="0" spid="469" grpId="12"/>
-      <p:bldP build="whole" bldLvl="1" animBg="1" rev="0" advAuto="0" spid="459" grpId="6"/>
-      <p:bldP build="whole" bldLvl="1" animBg="1" rev="0" advAuto="0" spid="465" grpId="5"/>
+      <p:bldP build="whole" bldLvl="1" animBg="1" rev="0" advAuto="0" spid="470" grpId="11"/>
     </p:bldLst>
   </p:timing>
 </p:sld>
@@ -12900,14 +12900,14 @@
       </p:par>
     </p:tnLst>
     <p:bldLst>
-      <p:bldP build="whole" bldLvl="1" animBg="1" rev="0" advAuto="0" spid="572" grpId="13"/>
-      <p:bldP build="whole" bldLvl="1" animBg="1" rev="0" advAuto="0" spid="573" grpId="10"/>
-      <p:bldP build="whole" bldLvl="1" animBg="1" rev="0" advAuto="0" spid="546" grpId="9"/>
-      <p:bldP build="whole" bldLvl="1" animBg="1" rev="0" advAuto="0" spid="575" grpId="8"/>
       <p:bldP build="whole" bldLvl="1" animBg="1" rev="0" advAuto="0" spid="531" grpId="6"/>
-      <p:bldP build="whole" bldLvl="1" animBg="1" rev="0" advAuto="0" spid="574" grpId="12"/>
       <p:bldP build="whole" bldLvl="1" animBg="1" rev="0" advAuto="0" spid="532" grpId="4"/>
       <p:bldP build="whole" bldLvl="1" animBg="1" rev="0" advAuto="0" spid="559" grpId="11"/>
+      <p:bldP build="whole" bldLvl="1" animBg="1" rev="0" advAuto="0" spid="573" grpId="10"/>
+      <p:bldP build="whole" bldLvl="1" animBg="1" rev="0" advAuto="0" spid="575" grpId="8"/>
+      <p:bldP build="whole" bldLvl="1" animBg="1" rev="0" advAuto="0" spid="546" grpId="9"/>
+      <p:bldP build="whole" bldLvl="1" animBg="1" rev="0" advAuto="0" spid="574" grpId="12"/>
+      <p:bldP build="whole" bldLvl="1" animBg="1" rev="0" advAuto="0" spid="572" grpId="13"/>
     </p:bldLst>
   </p:timing>
 </p:sld>
@@ -16860,30 +16860,30 @@
       </p:par>
     </p:tnLst>
     <p:bldLst>
+      <p:bldP build="whole" bldLvl="1" animBg="1" rev="0" advAuto="0" spid="601" grpId="7"/>
+      <p:bldP build="whole" bldLvl="1" animBg="1" rev="0" advAuto="0" spid="629" grpId="16"/>
+      <p:bldP build="whole" bldLvl="1" animBg="1" rev="0" advAuto="0" spid="612" grpId="19"/>
+      <p:bldP build="whole" bldLvl="1" animBg="1" rev="0" advAuto="0" spid="645" grpId="29"/>
+      <p:bldP build="whole" bldLvl="1" animBg="1" rev="0" advAuto="0" spid="623" grpId="13"/>
+      <p:bldP build="whole" bldLvl="1" animBg="1" rev="0" advAuto="0" spid="604" grpId="12"/>
+      <p:bldP build="whole" bldLvl="1" animBg="1" rev="0" advAuto="0" spid="607" grpId="15"/>
+      <p:bldP build="whole" bldLvl="1" animBg="1" rev="0" advAuto="0" spid="646" grpId="30"/>
+      <p:bldP build="whole" bldLvl="1" animBg="1" rev="0" advAuto="0" spid="648" grpId="31"/>
+      <p:bldP build="whole" bldLvl="1" animBg="1" rev="0" advAuto="0" spid="578" grpId="3"/>
+      <p:bldP build="whole" bldLvl="1" animBg="1" rev="0" advAuto="0" spid="643" grpId="27"/>
+      <p:bldP build="whole" bldLvl="1" animBg="1" rev="0" advAuto="0" spid="626" grpId="10"/>
+      <p:bldP build="whole" bldLvl="1" animBg="1" rev="0" advAuto="0" spid="617" grpId="1"/>
+      <p:bldP build="whole" bldLvl="1" animBg="1" rev="0" advAuto="0" spid="594" grpId="6"/>
+      <p:bldP build="whole" bldLvl="1" animBg="1" rev="0" advAuto="0" spid="642" grpId="26"/>
+      <p:bldP build="whole" bldLvl="1" animBg="1" rev="0" advAuto="0" spid="620" grpId="8"/>
+      <p:bldP build="whole" bldLvl="1" animBg="1" rev="0" advAuto="0" spid="633" grpId="24"/>
+      <p:bldP build="whole" bldLvl="1" animBg="1" rev="0" advAuto="0" spid="597" grpId="9"/>
+      <p:bldP build="whole" bldLvl="1" animBg="1" rev="0" advAuto="0" spid="642" grpId="25"/>
+      <p:bldP build="whole" bldLvl="1" animBg="1" rev="0" advAuto="0" spid="647" grpId="32"/>
+      <p:bldP build="whole" bldLvl="1" animBg="1" rev="0" advAuto="0" spid="583" grpId="2"/>
       <p:bldP build="whole" bldLvl="1" animBg="1" rev="0" advAuto="0" spid="583" grpId="4"/>
-      <p:bldP build="whole" bldLvl="1" animBg="1" rev="0" advAuto="0" spid="642" grpId="25"/>
-      <p:bldP build="whole" bldLvl="1" animBg="1" rev="0" advAuto="0" spid="642" grpId="26"/>
-      <p:bldP build="whole" bldLvl="1" animBg="1" rev="0" advAuto="0" spid="607" grpId="15"/>
-      <p:bldP build="whole" bldLvl="1" animBg="1" rev="0" advAuto="0" spid="612" grpId="19"/>
-      <p:bldP build="whole" bldLvl="1" animBg="1" rev="0" advAuto="0" spid="647" grpId="32"/>
+      <p:bldP build="whole" bldLvl="1" animBg="1" rev="0" advAuto="0" spid="594" grpId="18"/>
       <p:bldP build="whole" bldLvl="1" animBg="1" rev="0" advAuto="0" spid="644" grpId="28"/>
-      <p:bldP build="whole" bldLvl="1" animBg="1" rev="0" advAuto="0" spid="604" grpId="12"/>
-      <p:bldP build="whole" bldLvl="1" animBg="1" rev="0" advAuto="0" spid="617" grpId="1"/>
-      <p:bldP build="whole" bldLvl="1" animBg="1" rev="0" advAuto="0" spid="601" grpId="7"/>
-      <p:bldP build="whole" bldLvl="1" animBg="1" rev="0" advAuto="0" spid="645" grpId="29"/>
-      <p:bldP build="whole" bldLvl="1" animBg="1" rev="0" advAuto="0" spid="626" grpId="10"/>
-      <p:bldP build="whole" bldLvl="1" animBg="1" rev="0" advAuto="0" spid="620" grpId="8"/>
-      <p:bldP build="whole" bldLvl="1" animBg="1" rev="0" advAuto="0" spid="597" grpId="9"/>
-      <p:bldP build="whole" bldLvl="1" animBg="1" rev="0" advAuto="0" spid="629" grpId="16"/>
-      <p:bldP build="whole" bldLvl="1" animBg="1" rev="0" advAuto="0" spid="594" grpId="6"/>
-      <p:bldP build="whole" bldLvl="1" animBg="1" rev="0" advAuto="0" spid="578" grpId="3"/>
-      <p:bldP build="whole" bldLvl="1" animBg="1" rev="0" advAuto="0" spid="646" grpId="30"/>
-      <p:bldP build="whole" bldLvl="1" animBg="1" rev="0" advAuto="0" spid="633" grpId="24"/>
-      <p:bldP build="whole" bldLvl="1" animBg="1" rev="0" advAuto="0" spid="643" grpId="27"/>
-      <p:bldP build="whole" bldLvl="1" animBg="1" rev="0" advAuto="0" spid="594" grpId="18"/>
-      <p:bldP build="whole" bldLvl="1" animBg="1" rev="0" advAuto="0" spid="623" grpId="13"/>
-      <p:bldP build="whole" bldLvl="1" animBg="1" rev="0" advAuto="0" spid="648" grpId="31"/>
-      <p:bldP build="whole" bldLvl="1" animBg="1" rev="0" advAuto="0" spid="583" grpId="2"/>
     </p:bldLst>
   </p:timing>
 </p:sld>
@@ -22163,14 +22163,14 @@
       </p:par>
     </p:tnLst>
     <p:bldLst>
+      <p:bldP build="whole" bldLvl="1" animBg="1" rev="0" advAuto="0" spid="144" grpId="7"/>
       <p:bldP build="whole" bldLvl="1" animBg="1" rev="0" advAuto="0" spid="129" grpId="5"/>
+      <p:bldP build="whole" bldLvl="1" animBg="1" rev="0" advAuto="0" spid="140" grpId="3"/>
+      <p:bldP build="whole" bldLvl="1" animBg="1" rev="0" advAuto="0" spid="123" grpId="2"/>
+      <p:bldP build="whole" bldLvl="1" animBg="1" rev="0" advAuto="0" spid="126" grpId="4"/>
+      <p:bldP build="whole" bldLvl="1" animBg="1" rev="0" advAuto="0" spid="143" grpId="6"/>
+      <p:bldP build="whole" bldLvl="1" animBg="1" rev="0" advAuto="0" spid="144" grpId="16"/>
       <p:bldP build="whole" bldLvl="1" animBg="1" rev="0" advAuto="0" spid="132" grpId="1"/>
-      <p:bldP build="whole" bldLvl="1" animBg="1" rev="0" advAuto="0" spid="140" grpId="3"/>
-      <p:bldP build="whole" bldLvl="1" animBg="1" rev="0" advAuto="0" spid="144" grpId="16"/>
-      <p:bldP build="whole" bldLvl="1" animBg="1" rev="0" advAuto="0" spid="143" grpId="6"/>
-      <p:bldP build="whole" bldLvl="1" animBg="1" rev="0" advAuto="0" spid="126" grpId="4"/>
-      <p:bldP build="whole" bldLvl="1" animBg="1" rev="0" advAuto="0" spid="123" grpId="2"/>
-      <p:bldP build="whole" bldLvl="1" animBg="1" rev="0" advAuto="0" spid="144" grpId="7"/>
     </p:bldLst>
   </p:timing>
 </p:sld>
@@ -28527,39 +28527,39 @@
       </p:par>
     </p:tnLst>
     <p:bldLst>
-      <p:bldP build="whole" bldLvl="1" animBg="1" rev="0" advAuto="0" spid="268" grpId="32"/>
-      <p:bldP build="whole" bldLvl="1" animBg="1" rev="0" advAuto="0" spid="204" grpId="7"/>
-      <p:bldP build="whole" bldLvl="1" animBg="1" rev="0" advAuto="0" spid="234" grpId="17"/>
+      <p:bldP build="whole" bldLvl="1" animBg="1" rev="0" advAuto="0" spid="210" grpId="9"/>
+      <p:bldP build="whole" bldLvl="1" animBg="1" rev="0" advAuto="0" spid="228" grpId="15"/>
       <p:bldP build="whole" bldLvl="1" animBg="1" rev="0" advAuto="0" spid="266" grpId="24"/>
-      <p:bldP build="whole" bldLvl="1" animBg="1" rev="0" advAuto="0" spid="240" grpId="19"/>
-      <p:bldP build="whole" bldLvl="1" animBg="1" rev="0" advAuto="0" spid="234" grpId="29"/>
+      <p:bldP build="whole" bldLvl="1" animBg="1" rev="0" advAuto="0" spid="198" grpId="5"/>
+      <p:bldP build="whole" bldLvl="1" animBg="1" rev="0" advAuto="0" spid="231" grpId="16"/>
       <p:bldP build="whole" bldLvl="1" animBg="1" rev="0" advAuto="0" spid="265" grpId="22"/>
       <p:bldP build="whole" bldLvl="1" animBg="1" rev="0" advAuto="0" spid="201" grpId="6"/>
+      <p:bldP build="whole" bldLvl="1" animBg="1" rev="0" advAuto="0" spid="228" grpId="31"/>
+      <p:bldP build="whole" bldLvl="1" animBg="1" rev="0" advAuto="0" spid="234" grpId="17"/>
+      <p:bldP build="whole" bldLvl="1" animBg="1" rev="0" advAuto="0" spid="216" grpId="11"/>
+      <p:bldP build="whole" bldLvl="1" animBg="1" rev="0" advAuto="0" spid="267" grpId="25"/>
+      <p:bldP build="whole" bldLvl="1" animBg="1" rev="0" advAuto="0" spid="265" grpId="35"/>
+      <p:bldP build="whole" bldLvl="1" animBg="1" rev="0" advAuto="0" spid="231" grpId="30"/>
+      <p:bldP build="whole" bldLvl="1" animBg="1" rev="0" advAuto="0" spid="219" grpId="12"/>
+      <p:bldP build="whole" bldLvl="1" animBg="1" rev="0" advAuto="0" spid="244" grpId="21"/>
+      <p:bldP build="whole" bldLvl="1" animBg="1" rev="0" advAuto="0" spid="237" grpId="18"/>
+      <p:bldP build="whole" bldLvl="1" animBg="1" rev="0" advAuto="0" spid="222" grpId="13"/>
+      <p:bldP build="whole" bldLvl="1" animBg="1" rev="0" advAuto="0" spid="213" grpId="10"/>
+      <p:bldP build="whole" bldLvl="1" animBg="1" rev="0" advAuto="0" spid="234" grpId="29"/>
+      <p:bldP build="whole" bldLvl="1" animBg="1" rev="0" advAuto="0" spid="207" grpId="8"/>
+      <p:bldP build="whole" bldLvl="1" animBg="1" rev="0" advAuto="0" spid="240" grpId="19"/>
+      <p:bldP build="whole" bldLvl="1" animBg="1" rev="0" advAuto="0" spid="225" grpId="14"/>
       <p:bldP build="whole" bldLvl="1" animBg="1" rev="0" advAuto="0" spid="186" grpId="1"/>
+      <p:bldP build="whole" bldLvl="1" animBg="1" rev="0" advAuto="0" spid="237" grpId="28"/>
+      <p:bldP build="whole" bldLvl="1" animBg="1" rev="0" advAuto="0" spid="275" grpId="36"/>
+      <p:bldP build="whole" bldLvl="1" animBg="1" rev="0" advAuto="0" spid="204" grpId="7"/>
+      <p:bldP build="whole" bldLvl="1" animBg="1" rev="0" advAuto="0" spid="240" grpId="27"/>
+      <p:bldP build="whole" bldLvl="1" animBg="1" rev="0" advAuto="0" spid="243" grpId="20"/>
+      <p:bldP build="whole" bldLvl="1" animBg="1" rev="0" advAuto="0" spid="268" grpId="32"/>
+      <p:bldP build="whole" bldLvl="1" animBg="1" rev="0" advAuto="0" spid="189" grpId="2"/>
+      <p:bldP build="whole" bldLvl="1" animBg="1" rev="0" advAuto="0" spid="243" grpId="26"/>
+      <p:bldP build="whole" bldLvl="1" animBg="1" rev="0" advAuto="0" spid="192" grpId="3"/>
       <p:bldP build="whole" bldLvl="1" animBg="1" rev="0" advAuto="0" spid="195" grpId="4"/>
-      <p:bldP build="whole" bldLvl="1" animBg="1" rev="0" advAuto="0" spid="243" grpId="20"/>
-      <p:bldP build="whole" bldLvl="1" animBg="1" rev="0" advAuto="0" spid="240" grpId="27"/>
-      <p:bldP build="whole" bldLvl="1" animBg="1" rev="0" advAuto="0" spid="210" grpId="9"/>
-      <p:bldP build="whole" bldLvl="1" animBg="1" rev="0" advAuto="0" spid="244" grpId="21"/>
-      <p:bldP build="whole" bldLvl="1" animBg="1" rev="0" advAuto="0" spid="243" grpId="26"/>
-      <p:bldP build="whole" bldLvl="1" animBg="1" rev="0" advAuto="0" spid="231" grpId="16"/>
-      <p:bldP build="whole" bldLvl="1" animBg="1" rev="0" advAuto="0" spid="265" grpId="35"/>
-      <p:bldP build="whole" bldLvl="1" animBg="1" rev="0" advAuto="0" spid="228" grpId="15"/>
-      <p:bldP build="whole" bldLvl="1" animBg="1" rev="0" advAuto="0" spid="225" grpId="14"/>
-      <p:bldP build="whole" bldLvl="1" animBg="1" rev="0" advAuto="0" spid="198" grpId="5"/>
-      <p:bldP build="whole" bldLvl="1" animBg="1" rev="0" advAuto="0" spid="213" grpId="10"/>
-      <p:bldP build="whole" bldLvl="1" animBg="1" rev="0" advAuto="0" spid="237" grpId="18"/>
-      <p:bldP build="whole" bldLvl="1" animBg="1" rev="0" advAuto="0" spid="189" grpId="2"/>
-      <p:bldP build="whole" bldLvl="1" animBg="1" rev="0" advAuto="0" spid="231" grpId="30"/>
-      <p:bldP build="whole" bldLvl="1" animBg="1" rev="0" advAuto="0" spid="275" grpId="36"/>
-      <p:bldP build="whole" bldLvl="1" animBg="1" rev="0" advAuto="0" spid="228" grpId="31"/>
-      <p:bldP build="whole" bldLvl="1" animBg="1" rev="0" advAuto="0" spid="207" grpId="8"/>
-      <p:bldP build="whole" bldLvl="1" animBg="1" rev="0" advAuto="0" spid="267" grpId="25"/>
-      <p:bldP build="whole" bldLvl="1" animBg="1" rev="0" advAuto="0" spid="216" grpId="11"/>
-      <p:bldP build="whole" bldLvl="1" animBg="1" rev="0" advAuto="0" spid="192" grpId="3"/>
-      <p:bldP build="whole" bldLvl="1" animBg="1" rev="0" advAuto="0" spid="237" grpId="28"/>
-      <p:bldP build="whole" bldLvl="1" animBg="1" rev="0" advAuto="0" spid="222" grpId="13"/>
-      <p:bldP build="whole" bldLvl="1" animBg="1" rev="0" advAuto="0" spid="219" grpId="12"/>
     </p:bldLst>
   </p:timing>
 </p:sld>
@@ -30852,21 +30852,21 @@
       </p:par>
     </p:tnLst>
     <p:bldLst>
+      <p:bldP build="whole" bldLvl="1" animBg="1" rev="0" advAuto="0" spid="307" grpId="4"/>
+      <p:bldP build="whole" bldLvl="1" animBg="1" rev="0" advAuto="0" spid="318" grpId="18"/>
+      <p:bldP build="whole" bldLvl="1" animBg="1" rev="0" advAuto="0" spid="310" grpId="13"/>
+      <p:bldP build="whole" bldLvl="1" animBg="1" rev="0" advAuto="0" spid="285" grpId="3"/>
+      <p:bldP build="whole" bldLvl="1" animBg="1" rev="0" advAuto="0" spid="306" grpId="1"/>
+      <p:bldP build="whole" bldLvl="1" animBg="1" rev="0" advAuto="0" spid="318" grpId="20"/>
+      <p:bldP build="whole" bldLvl="1" animBg="1" rev="0" advAuto="0" spid="308" grpId="7"/>
+      <p:bldP build="whole" bldLvl="1" animBg="1" rev="0" advAuto="0" spid="292" grpId="21"/>
+      <p:bldP build="whole" bldLvl="1" animBg="1" rev="0" advAuto="0" spid="311" grpId="2"/>
+      <p:bldP build="whole" bldLvl="1" animBg="1" rev="0" advAuto="0" spid="299" grpId="9"/>
+      <p:bldP build="whole" bldLvl="1" animBg="1" rev="0" advAuto="0" spid="299" grpId="12"/>
       <p:bldP build="whole" bldLvl="1" animBg="1" rev="0" advAuto="0" spid="292" grpId="6"/>
-      <p:bldP build="whole" bldLvl="1" animBg="1" rev="0" advAuto="0" spid="308" grpId="7"/>
+      <p:bldP build="whole" bldLvl="1" animBg="1" rev="0" advAuto="0" spid="309" grpId="10"/>
       <p:bldP build="whole" bldLvl="1" animBg="1" rev="0" advAuto="0" spid="305" grpId="15"/>
-      <p:bldP build="whole" bldLvl="1" animBg="1" rev="0" advAuto="0" spid="285" grpId="3"/>
-      <p:bldP build="whole" bldLvl="1" animBg="1" rev="0" advAuto="0" spid="311" grpId="2"/>
       <p:bldP build="whole" bldLvl="1" animBg="1" rev="0" advAuto="0" spid="305" grpId="17"/>
-      <p:bldP build="whole" bldLvl="1" animBg="1" rev="0" advAuto="0" spid="307" grpId="4"/>
-      <p:bldP build="whole" bldLvl="1" animBg="1" rev="0" advAuto="0" spid="306" grpId="1"/>
-      <p:bldP build="whole" bldLvl="1" animBg="1" rev="0" advAuto="0" spid="318" grpId="18"/>
-      <p:bldP build="whole" bldLvl="1" animBg="1" rev="0" advAuto="0" spid="318" grpId="20"/>
-      <p:bldP build="whole" bldLvl="1" animBg="1" rev="0" advAuto="0" spid="292" grpId="21"/>
-      <p:bldP build="whole" bldLvl="1" animBg="1" rev="0" advAuto="0" spid="299" grpId="9"/>
-      <p:bldP build="whole" bldLvl="1" animBg="1" rev="0" advAuto="0" spid="309" grpId="10"/>
-      <p:bldP build="whole" bldLvl="1" animBg="1" rev="0" advAuto="0" spid="299" grpId="12"/>
-      <p:bldP build="whole" bldLvl="1" animBg="1" rev="0" advAuto="0" spid="310" grpId="13"/>
     </p:bldLst>
   </p:timing>
 </p:sld>
@@ -31744,9 +31744,9 @@
       </p:par>
     </p:tnLst>
     <p:bldLst>
-      <p:bldP build="whole" bldLvl="1" animBg="1" rev="0" advAuto="0" spid="332" grpId="1"/>
       <p:bldP build="whole" bldLvl="1" animBg="1" rev="0" advAuto="0" spid="335" grpId="2"/>
       <p:bldP build="whole" bldLvl="1" animBg="1" rev="0" advAuto="0" spid="338" grpId="3"/>
+      <p:bldP build="whole" bldLvl="1" animBg="1" rev="0" advAuto="0" spid="332" grpId="1"/>
     </p:bldLst>
   </p:timing>
 </p:sld>
@@ -33302,16 +33302,16 @@
       </p:par>
     </p:tnLst>
     <p:bldLst>
+      <p:bldP build="whole" bldLvl="1" animBg="1" rev="0" advAuto="0" spid="357" grpId="3"/>
+      <p:bldP build="whole" bldLvl="1" animBg="1" rev="0" advAuto="0" spid="354" grpId="5"/>
       <p:bldP build="whole" bldLvl="1" animBg="1" rev="0" advAuto="0" spid="350" grpId="1"/>
-      <p:bldP build="whole" bldLvl="1" animBg="1" rev="0" advAuto="0" spid="354" grpId="5"/>
       <p:bldP build="whole" bldLvl="1" animBg="1" rev="0" advAuto="0" spid="352" grpId="2"/>
+      <p:bldP build="whole" bldLvl="1" animBg="1" rev="0" advAuto="0" spid="360" grpId="10"/>
+      <p:bldP build="whole" bldLvl="1" animBg="1" rev="0" advAuto="0" spid="359" grpId="9"/>
+      <p:bldP build="whole" bldLvl="1" animBg="1" rev="0" advAuto="0" spid="355" grpId="7"/>
       <p:bldP build="whole" bldLvl="1" animBg="1" rev="0" advAuto="0" spid="351" grpId="8"/>
-      <p:bldP build="whole" bldLvl="1" animBg="1" rev="0" advAuto="0" spid="360" grpId="10"/>
-      <p:bldP build="whole" bldLvl="1" animBg="1" rev="0" advAuto="0" spid="355" grpId="7"/>
-      <p:bldP build="whole" bldLvl="1" animBg="1" rev="0" advAuto="0" spid="359" grpId="9"/>
       <p:bldP build="whole" bldLvl="1" animBg="1" rev="0" advAuto="0" spid="353" grpId="4"/>
       <p:bldP build="whole" bldLvl="1" animBg="1" rev="0" advAuto="0" spid="356" grpId="6"/>
-      <p:bldP build="whole" bldLvl="1" animBg="1" rev="0" advAuto="0" spid="357" grpId="3"/>
     </p:bldLst>
   </p:timing>
 </p:sld>

</xml_diff>

<commit_message>
Recently I am trying to open my mind
</commit_message>
<xml_diff>
--- a/Git入門.pptx
+++ b/Git入門.pptx
@@ -4851,12 +4851,12 @@
       </p:par>
     </p:tnLst>
     <p:bldLst>
+      <p:bldP build="whole" bldLvl="1" animBg="1" rev="0" advAuto="0" spid="378" grpId="6"/>
       <p:bldP build="whole" bldLvl="1" animBg="1" rev="0" advAuto="0" spid="395" grpId="1"/>
-      <p:bldP build="whole" bldLvl="1" animBg="1" rev="0" advAuto="0" spid="402" grpId="4"/>
       <p:bldP build="whole" bldLvl="1" animBg="1" rev="0" advAuto="0" spid="400" grpId="5"/>
       <p:bldP build="whole" bldLvl="1" animBg="1" rev="0" advAuto="0" spid="401" grpId="2"/>
-      <p:bldP build="whole" bldLvl="1" animBg="1" rev="0" advAuto="0" spid="378" grpId="6"/>
       <p:bldP build="whole" bldLvl="1" animBg="1" rev="0" advAuto="0" spid="404" grpId="3"/>
+      <p:bldP build="whole" bldLvl="1" animBg="1" rev="0" advAuto="0" spid="402" grpId="4"/>
     </p:bldLst>
   </p:timing>
 </p:sld>
@@ -6411,12 +6411,12 @@
       </p:par>
     </p:tnLst>
     <p:bldLst>
+      <p:bldP build="whole" bldLvl="1" animBg="1" rev="0" advAuto="0" spid="408" grpId="2"/>
       <p:bldP build="whole" bldLvl="1" animBg="1" rev="0" advAuto="0" spid="425" grpId="1"/>
+      <p:bldP build="whole" bldLvl="1" animBg="1" rev="0" advAuto="0" spid="430" grpId="5"/>
       <p:bldP build="whole" bldLvl="1" animBg="1" rev="0" advAuto="0" spid="433" grpId="3"/>
-      <p:bldP build="whole" bldLvl="1" animBg="1" rev="0" advAuto="0" spid="408" grpId="2"/>
+      <p:bldP build="whole" bldLvl="1" animBg="1" rev="0" advAuto="0" spid="431" grpId="4"/>
       <p:bldP build="whole" bldLvl="1" animBg="1" rev="0" advAuto="0" spid="434" grpId="6"/>
-      <p:bldP build="whole" bldLvl="1" animBg="1" rev="0" advAuto="0" spid="431" grpId="4"/>
-      <p:bldP build="whole" bldLvl="1" animBg="1" rev="0" advAuto="0" spid="430" grpId="5"/>
     </p:bldLst>
   </p:timing>
 </p:sld>
@@ -6805,7 +6805,7 @@
         <p:spPr>
           <a:xfrm>
             <a:off x="1257020" y="5996492"/>
-            <a:ext cx="10490760" cy="3606801"/>
+            <a:ext cx="10408464" cy="3606801"/>
           </a:xfrm>
           <a:prstGeom prst="rect">
             <a:avLst/>
@@ -6855,7 +6855,7 @@
               <a:buAutoNum type="arabicPeriod" startAt="1"/>
             </a:pPr>
             <a:r>
-              <a:t>git diff.          現在のリポジトリとインデックスもしくは編集分の差分</a:t>
+              <a:t>git diff          現在のリポジトリとインデックスもしくは編集分の差分</a:t>
             </a:r>
           </a:p>
           <a:p>
@@ -8767,18 +8767,18 @@
       </p:par>
     </p:tnLst>
     <p:bldLst>
-      <p:bldP build="whole" bldLvl="1" animBg="1" rev="0" advAuto="0" spid="485" grpId="12"/>
-      <p:bldP build="whole" bldLvl="1" animBg="1" rev="0" advAuto="0" spid="475" grpId="6"/>
+      <p:bldP build="whole" bldLvl="1" animBg="1" rev="0" advAuto="0" spid="472" grpId="3"/>
+      <p:bldP build="whole" bldLvl="1" animBg="1" rev="0" advAuto="0" spid="455" grpId="4"/>
+      <p:bldP build="whole" bldLvl="1" animBg="1" rev="0" advAuto="0" spid="478" grpId="10"/>
       <p:bldP build="whole" bldLvl="1" animBg="1" rev="0" advAuto="0" spid="484" grpId="7"/>
       <p:bldP build="whole" bldLvl="1" animBg="1" rev="0" advAuto="0" spid="477" grpId="9"/>
-      <p:bldP build="whole" bldLvl="1" animBg="1" rev="0" advAuto="0" spid="472" grpId="3"/>
-      <p:bldP build="whole" bldLvl="1" animBg="1" rev="0" advAuto="0" spid="478" grpId="10"/>
-      <p:bldP build="whole" bldLvl="1" animBg="1" rev="0" advAuto="0" spid="455" grpId="4"/>
-      <p:bldP build="whole" bldLvl="1" animBg="1" rev="0" advAuto="0" spid="486" grpId="11"/>
       <p:bldP build="whole" bldLvl="1" animBg="1" rev="0" advAuto="0" spid="476" grpId="8"/>
-      <p:bldP build="whole" bldLvl="1" animBg="1" rev="0" advAuto="0" spid="481" grpId="5"/>
       <p:bldP build="whole" bldLvl="1" animBg="1" rev="0" advAuto="0" spid="452" grpId="1"/>
       <p:bldP build="whole" bldLvl="1" animBg="1" rev="0" advAuto="0" spid="452" grpId="2"/>
+      <p:bldP build="whole" bldLvl="1" animBg="1" rev="0" advAuto="0" spid="486" grpId="11"/>
+      <p:bldP build="whole" bldLvl="1" animBg="1" rev="0" advAuto="0" spid="475" grpId="6"/>
+      <p:bldP build="whole" bldLvl="1" animBg="1" rev="0" advAuto="0" spid="481" grpId="5"/>
+      <p:bldP build="whole" bldLvl="1" animBg="1" rev="0" advAuto="0" spid="485" grpId="12"/>
     </p:bldLst>
   </p:timing>
 </p:sld>
@@ -12925,14 +12925,14 @@
       </p:par>
     </p:tnLst>
     <p:bldLst>
+      <p:bldP build="whole" bldLvl="1" animBg="1" rev="0" advAuto="0" spid="590" grpId="12"/>
+      <p:bldP build="whole" bldLvl="1" animBg="1" rev="0" advAuto="0" spid="562" grpId="9"/>
       <p:bldP build="whole" bldLvl="1" animBg="1" rev="0" advAuto="0" spid="589" grpId="10"/>
-      <p:bldP build="whole" bldLvl="1" animBg="1" rev="0" advAuto="0" spid="562" grpId="9"/>
       <p:bldP build="whole" bldLvl="1" animBg="1" rev="0" advAuto="0" spid="575" grpId="11"/>
       <p:bldP build="whole" bldLvl="1" animBg="1" rev="0" advAuto="0" spid="588" grpId="13"/>
+      <p:bldP build="whole" bldLvl="1" animBg="1" rev="0" advAuto="0" spid="548" grpId="4"/>
       <p:bldP build="whole" bldLvl="1" animBg="1" rev="0" advAuto="0" spid="591" grpId="8"/>
       <p:bldP build="whole" bldLvl="1" animBg="1" rev="0" advAuto="0" spid="547" grpId="6"/>
-      <p:bldP build="whole" bldLvl="1" animBg="1" rev="0" advAuto="0" spid="548" grpId="4"/>
-      <p:bldP build="whole" bldLvl="1" animBg="1" rev="0" advAuto="0" spid="590" grpId="12"/>
     </p:bldLst>
   </p:timing>
 </p:sld>
@@ -16885,30 +16885,30 @@
       </p:par>
     </p:tnLst>
     <p:bldLst>
+      <p:bldP build="whole" bldLvl="1" animBg="1" rev="0" advAuto="0" spid="623" grpId="15"/>
+      <p:bldP build="whole" bldLvl="1" animBg="1" rev="0" advAuto="0" spid="658" grpId="25"/>
+      <p:bldP build="whole" bldLvl="1" animBg="1" rev="0" advAuto="0" spid="658" grpId="26"/>
       <p:bldP build="whole" bldLvl="1" animBg="1" rev="0" advAuto="0" spid="642" grpId="10"/>
-      <p:bldP build="whole" bldLvl="1" animBg="1" rev="0" advAuto="0" spid="659" grpId="27"/>
+      <p:bldP build="whole" bldLvl="1" animBg="1" rev="0" advAuto="0" spid="662" grpId="30"/>
       <p:bldP build="whole" bldLvl="1" animBg="1" rev="0" advAuto="0" spid="610" grpId="6"/>
       <p:bldP build="whole" bldLvl="1" animBg="1" rev="0" advAuto="0" spid="649" grpId="24"/>
-      <p:bldP build="whole" bldLvl="1" animBg="1" rev="0" advAuto="0" spid="658" grpId="25"/>
-      <p:bldP build="whole" bldLvl="1" animBg="1" rev="0" advAuto="0" spid="658" grpId="26"/>
+      <p:bldP build="whole" bldLvl="1" animBg="1" rev="0" advAuto="0" spid="633" grpId="1"/>
+      <p:bldP build="whole" bldLvl="1" animBg="1" rev="0" advAuto="0" spid="636" grpId="8"/>
+      <p:bldP build="whole" bldLvl="1" animBg="1" rev="0" advAuto="0" spid="594" grpId="3"/>
+      <p:bldP build="whole" bldLvl="1" animBg="1" rev="0" advAuto="0" spid="659" grpId="27"/>
+      <p:bldP build="whole" bldLvl="1" animBg="1" rev="0" advAuto="0" spid="599" grpId="2"/>
       <p:bldP build="whole" bldLvl="1" animBg="1" rev="0" advAuto="0" spid="613" grpId="9"/>
-      <p:bldP build="whole" bldLvl="1" animBg="1" rev="0" advAuto="0" spid="633" grpId="1"/>
-      <p:bldP build="whole" bldLvl="1" animBg="1" rev="0" advAuto="0" spid="599" grpId="2"/>
-      <p:bldP build="whole" bldLvl="1" animBg="1" rev="0" advAuto="0" spid="636" grpId="8"/>
       <p:bldP build="whole" bldLvl="1" animBg="1" rev="0" advAuto="0" spid="599" grpId="4"/>
       <p:bldP build="whole" bldLvl="1" animBg="1" rev="0" advAuto="0" spid="660" grpId="28"/>
-      <p:bldP build="whole" bldLvl="1" animBg="1" rev="0" advAuto="0" spid="661" grpId="29"/>
+      <p:bldP build="whole" bldLvl="1" animBg="1" rev="0" advAuto="0" spid="664" grpId="31"/>
+      <p:bldP build="whole" bldLvl="1" animBg="1" rev="0" advAuto="0" spid="663" grpId="32"/>
       <p:bldP build="whole" bldLvl="1" animBg="1" rev="0" advAuto="0" spid="610" grpId="18"/>
       <p:bldP build="whole" bldLvl="1" animBg="1" rev="0" advAuto="0" spid="617" grpId="7"/>
       <p:bldP build="whole" bldLvl="1" animBg="1" rev="0" advAuto="0" spid="645" grpId="16"/>
-      <p:bldP build="whole" bldLvl="1" animBg="1" rev="0" advAuto="0" spid="594" grpId="3"/>
       <p:bldP build="whole" bldLvl="1" animBg="1" rev="0" advAuto="0" spid="628" grpId="19"/>
+      <p:bldP build="whole" bldLvl="1" animBg="1" rev="0" advAuto="0" spid="661" grpId="29"/>
+      <p:bldP build="whole" bldLvl="1" animBg="1" rev="0" advAuto="0" spid="620" grpId="12"/>
       <p:bldP build="whole" bldLvl="1" animBg="1" rev="0" advAuto="0" spid="639" grpId="13"/>
-      <p:bldP build="whole" bldLvl="1" animBg="1" rev="0" advAuto="0" spid="620" grpId="12"/>
-      <p:bldP build="whole" bldLvl="1" animBg="1" rev="0" advAuto="0" spid="662" grpId="30"/>
-      <p:bldP build="whole" bldLvl="1" animBg="1" rev="0" advAuto="0" spid="623" grpId="15"/>
-      <p:bldP build="whole" bldLvl="1" animBg="1" rev="0" advAuto="0" spid="663" grpId="32"/>
-      <p:bldP build="whole" bldLvl="1" animBg="1" rev="0" advAuto="0" spid="664" grpId="31"/>
     </p:bldLst>
   </p:timing>
 </p:sld>
@@ -22189,13 +22189,13 @@
     </p:tnLst>
     <p:bldLst>
       <p:bldP build="whole" bldLvl="1" animBg="1" rev="0" advAuto="0" spid="123" grpId="2"/>
+      <p:bldP build="whole" bldLvl="1" animBg="1" rev="0" advAuto="0" spid="143" grpId="6"/>
+      <p:bldP build="whole" bldLvl="1" animBg="1" rev="0" advAuto="0" spid="144" grpId="16"/>
+      <p:bldP build="whole" bldLvl="1" animBg="1" rev="0" advAuto="0" spid="126" grpId="4"/>
+      <p:bldP build="whole" bldLvl="1" animBg="1" rev="0" advAuto="0" spid="144" grpId="7"/>
       <p:bldP build="whole" bldLvl="1" animBg="1" rev="0" advAuto="0" spid="129" grpId="5"/>
-      <p:bldP build="whole" bldLvl="1" animBg="1" rev="0" advAuto="0" spid="143" grpId="6"/>
-      <p:bldP build="whole" bldLvl="1" animBg="1" rev="0" advAuto="0" spid="126" grpId="4"/>
+      <p:bldP build="whole" bldLvl="1" animBg="1" rev="0" advAuto="0" spid="132" grpId="1"/>
       <p:bldP build="whole" bldLvl="1" animBg="1" rev="0" advAuto="0" spid="140" grpId="3"/>
-      <p:bldP build="whole" bldLvl="1" animBg="1" rev="0" advAuto="0" spid="144" grpId="16"/>
-      <p:bldP build="whole" bldLvl="1" animBg="1" rev="0" advAuto="0" spid="132" grpId="1"/>
-      <p:bldP build="whole" bldLvl="1" animBg="1" rev="0" advAuto="0" spid="144" grpId="7"/>
     </p:bldLst>
   </p:timing>
 </p:sld>
@@ -29188,38 +29188,38 @@
       </p:par>
     </p:tnLst>
     <p:bldLst>
+      <p:bldP build="whole" bldLvl="1" animBg="1" rev="0" advAuto="0" spid="281" grpId="22"/>
       <p:bldP build="whole" bldLvl="1" animBg="1" rev="0" advAuto="0" spid="247" grpId="16"/>
-      <p:bldP build="whole" bldLvl="1" animBg="1" rev="0" advAuto="0" spid="220" grpId="7"/>
-      <p:bldP build="whole" bldLvl="1" animBg="1" rev="0" advAuto="0" spid="214" grpId="5"/>
+      <p:bldP build="whole" bldLvl="1" animBg="1" rev="0" advAuto="0" spid="250" grpId="17"/>
+      <p:bldP build="whole" bldLvl="1" animBg="1" rev="0" advAuto="0" spid="232" grpId="11"/>
+      <p:bldP build="whole" bldLvl="1" animBg="1" rev="0" advAuto="0" spid="223" grpId="8"/>
+      <p:bldP build="whole" bldLvl="1" animBg="1" rev="0" advAuto="0" spid="241" grpId="14"/>
+      <p:bldP build="whole" bldLvl="1" animBg="1" rev="0" advAuto="0" spid="202" grpId="1"/>
+      <p:bldP build="whole" bldLvl="1" animBg="1" rev="0" advAuto="0" spid="260" grpId="21"/>
+      <p:bldP build="whole" bldLvl="1" animBg="1" rev="0" advAuto="0" spid="253" grpId="18"/>
       <p:bldP build="whole" bldLvl="1" animBg="1" rev="0" advAuto="0" spid="282" grpId="24"/>
       <p:bldP build="whole" bldLvl="1" animBg="1" rev="0" advAuto="0" spid="281" grpId="35"/>
+      <p:bldP build="whole" bldLvl="1" animBg="1" rev="0" advAuto="0" spid="250" grpId="29"/>
+      <p:bldP build="whole" bldLvl="1" animBg="1" rev="0" advAuto="0" spid="247" grpId="30"/>
+      <p:bldP build="whole" bldLvl="1" animBg="1" rev="0" advAuto="0" spid="291" grpId="36"/>
+      <p:bldP build="whole" bldLvl="1" animBg="1" rev="0" advAuto="0" spid="259" grpId="20"/>
+      <p:bldP build="whole" bldLvl="1" animBg="1" rev="0" advAuto="0" spid="214" grpId="5"/>
+      <p:bldP build="whole" bldLvl="1" animBg="1" rev="0" advAuto="0" spid="253" grpId="28"/>
+      <p:bldP build="whole" bldLvl="1" animBg="1" rev="0" advAuto="0" spid="256" grpId="19"/>
+      <p:bldP build="whole" bldLvl="1" animBg="1" rev="0" advAuto="0" spid="235" grpId="12"/>
+      <p:bldP build="whole" bldLvl="1" animBg="1" rev="0" advAuto="0" spid="259" grpId="26"/>
+      <p:bldP build="whole" bldLvl="1" animBg="1" rev="0" advAuto="0" spid="220" grpId="7"/>
+      <p:bldP build="whole" bldLvl="1" animBg="1" rev="0" advAuto="0" spid="211" grpId="4"/>
+      <p:bldP build="whole" bldLvl="1" animBg="1" rev="0" advAuto="0" spid="238" grpId="13"/>
+      <p:bldP build="whole" bldLvl="1" animBg="1" rev="0" advAuto="0" spid="284" grpId="32"/>
+      <p:bldP build="whole" bldLvl="1" animBg="1" rev="0" advAuto="0" spid="256" grpId="27"/>
+      <p:bldP build="whole" bldLvl="1" animBg="1" rev="0" advAuto="0" spid="217" grpId="6"/>
+      <p:bldP build="whole" bldLvl="1" animBg="1" rev="0" advAuto="0" spid="208" grpId="3"/>
+      <p:bldP build="whole" bldLvl="1" animBg="1" rev="0" advAuto="0" spid="205" grpId="2"/>
       <p:bldP build="whole" bldLvl="1" animBg="1" rev="0" advAuto="0" spid="283" grpId="25"/>
-      <p:bldP build="whole" bldLvl="1" animBg="1" rev="0" advAuto="0" spid="235" grpId="12"/>
-      <p:bldP build="whole" bldLvl="1" animBg="1" rev="0" advAuto="0" spid="208" grpId="3"/>
-      <p:bldP build="whole" bldLvl="1" animBg="1" rev="0" advAuto="0" spid="259" grpId="20"/>
-      <p:bldP build="whole" bldLvl="1" animBg="1" rev="0" advAuto="0" spid="291" grpId="36"/>
-      <p:bldP build="whole" bldLvl="1" animBg="1" rev="0" advAuto="0" spid="253" grpId="18"/>
-      <p:bldP build="whole" bldLvl="1" animBg="1" rev="0" advAuto="0" spid="259" grpId="26"/>
-      <p:bldP build="whole" bldLvl="1" animBg="1" rev="0" advAuto="0" spid="250" grpId="17"/>
-      <p:bldP build="whole" bldLvl="1" animBg="1" rev="0" advAuto="0" spid="247" grpId="30"/>
+      <p:bldP build="whole" bldLvl="1" animBg="1" rev="0" advAuto="0" spid="244" grpId="15"/>
       <p:bldP build="whole" bldLvl="1" animBg="1" rev="0" advAuto="0" spid="229" grpId="10"/>
-      <p:bldP build="whole" bldLvl="1" animBg="1" rev="0" advAuto="0" spid="202" grpId="1"/>
-      <p:bldP build="whole" bldLvl="1" animBg="1" rev="0" advAuto="0" spid="253" grpId="28"/>
-      <p:bldP build="whole" bldLvl="1" animBg="1" rev="0" advAuto="0" spid="250" grpId="29"/>
-      <p:bldP build="whole" bldLvl="1" animBg="1" rev="0" advAuto="0" spid="211" grpId="4"/>
-      <p:bldP build="whole" bldLvl="1" animBg="1" rev="0" advAuto="0" spid="244" grpId="15"/>
-      <p:bldP build="whole" bldLvl="1" animBg="1" rev="0" advAuto="0" spid="205" grpId="2"/>
-      <p:bldP build="whole" bldLvl="1" animBg="1" rev="0" advAuto="0" spid="232" grpId="11"/>
-      <p:bldP build="whole" bldLvl="1" animBg="1" rev="0" advAuto="0" spid="223" grpId="8"/>
       <p:bldP build="whole" bldLvl="1" animBg="1" rev="0" advAuto="0" spid="244" grpId="31"/>
-      <p:bldP build="whole" bldLvl="1" animBg="1" rev="0" advAuto="0" spid="256" grpId="19"/>
-      <p:bldP build="whole" bldLvl="1" animBg="1" rev="0" advAuto="0" spid="241" grpId="14"/>
-      <p:bldP build="whole" bldLvl="1" animBg="1" rev="0" advAuto="0" spid="238" grpId="13"/>
-      <p:bldP build="whole" bldLvl="1" animBg="1" rev="0" advAuto="0" spid="256" grpId="27"/>
-      <p:bldP build="whole" bldLvl="1" animBg="1" rev="0" advAuto="0" spid="281" grpId="22"/>
-      <p:bldP build="whole" bldLvl="1" animBg="1" rev="0" advAuto="0" spid="260" grpId="21"/>
-      <p:bldP build="whole" bldLvl="1" animBg="1" rev="0" advAuto="0" spid="284" grpId="32"/>
-      <p:bldP build="whole" bldLvl="1" animBg="1" rev="0" advAuto="0" spid="217" grpId="6"/>
       <p:bldP build="whole" bldLvl="1" animBg="1" rev="0" advAuto="0" spid="226" grpId="9"/>
     </p:bldLst>
   </p:timing>
@@ -31513,21 +31513,21 @@
       </p:par>
     </p:tnLst>
     <p:bldLst>
+      <p:bldP build="whole" bldLvl="1" animBg="1" rev="0" advAuto="0" spid="301" grpId="3"/>
+      <p:bldP build="whole" bldLvl="1" animBg="1" rev="0" advAuto="0" spid="325" grpId="10"/>
+      <p:bldP build="whole" bldLvl="1" animBg="1" rev="0" advAuto="0" spid="308" grpId="6"/>
+      <p:bldP build="whole" bldLvl="1" animBg="1" rev="0" advAuto="0" spid="321" grpId="15"/>
       <p:bldP build="whole" bldLvl="1" animBg="1" rev="0" advAuto="0" spid="323" grpId="4"/>
+      <p:bldP build="whole" bldLvl="1" animBg="1" rev="0" advAuto="0" spid="327" grpId="2"/>
+      <p:bldP build="whole" bldLvl="1" animBg="1" rev="0" advAuto="0" spid="315" grpId="9"/>
+      <p:bldP build="whole" bldLvl="1" animBg="1" rev="0" advAuto="0" spid="315" grpId="12"/>
       <p:bldP build="whole" bldLvl="1" animBg="1" rev="0" advAuto="0" spid="321" grpId="17"/>
+      <p:bldP build="whole" bldLvl="1" animBg="1" rev="0" advAuto="0" spid="326" grpId="13"/>
+      <p:bldP build="whole" bldLvl="1" animBg="1" rev="0" advAuto="0" spid="322" grpId="1"/>
+      <p:bldP build="whole" bldLvl="1" animBg="1" rev="0" advAuto="0" spid="324" grpId="7"/>
       <p:bldP build="whole" bldLvl="1" animBg="1" rev="0" advAuto="0" spid="308" grpId="21"/>
-      <p:bldP build="whole" bldLvl="1" animBg="1" rev="0" advAuto="0" spid="322" grpId="1"/>
-      <p:bldP build="whole" bldLvl="1" animBg="1" rev="0" advAuto="0" spid="315" grpId="9"/>
       <p:bldP build="whole" bldLvl="1" animBg="1" rev="0" advAuto="0" spid="334" grpId="18"/>
-      <p:bldP build="whole" bldLvl="1" animBg="1" rev="0" advAuto="0" spid="325" grpId="10"/>
-      <p:bldP build="whole" bldLvl="1" animBg="1" rev="0" advAuto="0" spid="315" grpId="12"/>
-      <p:bldP build="whole" bldLvl="1" animBg="1" rev="0" advAuto="0" spid="324" grpId="7"/>
-      <p:bldP build="whole" bldLvl="1" animBg="1" rev="0" advAuto="0" spid="301" grpId="3"/>
-      <p:bldP build="whole" bldLvl="1" animBg="1" rev="0" advAuto="0" spid="326" grpId="13"/>
-      <p:bldP build="whole" bldLvl="1" animBg="1" rev="0" advAuto="0" spid="321" grpId="15"/>
       <p:bldP build="whole" bldLvl="1" animBg="1" rev="0" advAuto="0" spid="334" grpId="20"/>
-      <p:bldP build="whole" bldLvl="1" animBg="1" rev="0" advAuto="0" spid="308" grpId="6"/>
-      <p:bldP build="whole" bldLvl="1" animBg="1" rev="0" advAuto="0" spid="327" grpId="2"/>
     </p:bldLst>
   </p:timing>
 </p:sld>
@@ -32405,9 +32405,9 @@
       </p:par>
     </p:tnLst>
     <p:bldLst>
+      <p:bldP build="whole" bldLvl="1" animBg="1" rev="0" advAuto="0" spid="348" grpId="1"/>
+      <p:bldP build="whole" bldLvl="1" animBg="1" rev="0" advAuto="0" spid="354" grpId="3"/>
       <p:bldP build="whole" bldLvl="1" animBg="1" rev="0" advAuto="0" spid="351" grpId="2"/>
-      <p:bldP build="whole" bldLvl="1" animBg="1" rev="0" advAuto="0" spid="354" grpId="3"/>
-      <p:bldP build="whole" bldLvl="1" animBg="1" rev="0" advAuto="0" spid="348" grpId="1"/>
     </p:bldLst>
   </p:timing>
 </p:sld>
@@ -33963,16 +33963,16 @@
       </p:par>
     </p:tnLst>
     <p:bldLst>
+      <p:bldP build="whole" bldLvl="1" animBg="1" rev="0" advAuto="0" spid="369" grpId="4"/>
       <p:bldP build="whole" bldLvl="1" animBg="1" rev="0" advAuto="0" spid="367" grpId="8"/>
-      <p:bldP build="whole" bldLvl="1" animBg="1" rev="0" advAuto="0" spid="376" grpId="10"/>
-      <p:bldP build="whole" bldLvl="1" animBg="1" rev="0" advAuto="0" spid="368" grpId="2"/>
+      <p:bldP build="whole" bldLvl="1" animBg="1" rev="0" advAuto="0" spid="366" grpId="1"/>
       <p:bldP build="whole" bldLvl="1" animBg="1" rev="0" advAuto="0" spid="375" grpId="9"/>
-      <p:bldP build="whole" bldLvl="1" animBg="1" rev="0" advAuto="0" spid="372" grpId="6"/>
-      <p:bldP build="whole" bldLvl="1" animBg="1" rev="0" advAuto="0" spid="369" grpId="4"/>
-      <p:bldP build="whole" bldLvl="1" animBg="1" rev="0" advAuto="0" spid="371" grpId="7"/>
-      <p:bldP build="whole" bldLvl="1" animBg="1" rev="0" advAuto="0" spid="366" grpId="1"/>
       <p:bldP build="whole" bldLvl="1" animBg="1" rev="0" advAuto="0" spid="373" grpId="3"/>
       <p:bldP build="whole" bldLvl="1" animBg="1" rev="0" advAuto="0" spid="370" grpId="5"/>
+      <p:bldP build="whole" bldLvl="1" animBg="1" rev="0" advAuto="0" spid="371" grpId="7"/>
+      <p:bldP build="whole" bldLvl="1" animBg="1" rev="0" advAuto="0" spid="376" grpId="10"/>
+      <p:bldP build="whole" bldLvl="1" animBg="1" rev="0" advAuto="0" spid="372" grpId="6"/>
+      <p:bldP build="whole" bldLvl="1" animBg="1" rev="0" advAuto="0" spid="368" grpId="2"/>
     </p:bldLst>
   </p:timing>
 </p:sld>

</xml_diff>